<commit_message>
Clarify second AAD tenant
</commit_message>
<xml_diff>
--- a/media-source/admin_contoso_org-bc.pptx
+++ b/media-source/admin_contoso_org-bc.pptx
@@ -4242,7 +4242,7 @@
               <a:latin typeface="Segoe UI" panose="020B0502040204020203" pitchFamily="34" charset="0"/>
               <a:cs typeface="Segoe UI" panose="020B0502040204020203" pitchFamily="34" charset="0"/>
             </a:rPr>
-            <a:t>Microsoft 365 account: de@contoso.com</a:t>
+            <a:t>Microsoft 365 account: de@contoso.de</a:t>
           </a:r>
           <a:endParaRPr lang="en-DK" dirty="0">
             <a:latin typeface="Segoe UI" panose="020B0502040204020203" pitchFamily="34" charset="0"/>
@@ -9435,7 +9435,7 @@
               <a:latin typeface="Segoe UI" panose="020B0502040204020203" pitchFamily="34" charset="0"/>
               <a:cs typeface="Segoe UI" panose="020B0502040204020203" pitchFamily="34" charset="0"/>
             </a:rPr>
-            <a:t>Microsoft 365 account: de@contoso.com</a:t>
+            <a:t>Microsoft 365 account: de@contoso.de</a:t>
           </a:r>
           <a:endParaRPr lang="en-DK" sz="1200" kern="1200" dirty="0">
             <a:latin typeface="Segoe UI" panose="020B0502040204020203" pitchFamily="34" charset="0"/>
@@ -18589,7 +18589,7 @@
           <a:p>
             <a:fld id="{904D49A9-ADA7-4370-9052-09D7E5AC09B3}" type="datetimeFigureOut">
               <a:rPr lang="en-DK" smtClean="0"/>
-              <a:t>28/12/2021</a:t>
+              <a:t>24/01/2022</a:t>
             </a:fld>
             <a:endParaRPr lang="en-DK"/>
           </a:p>
@@ -18789,7 +18789,7 @@
           <a:p>
             <a:fld id="{904D49A9-ADA7-4370-9052-09D7E5AC09B3}" type="datetimeFigureOut">
               <a:rPr lang="en-DK" smtClean="0"/>
-              <a:t>28/12/2021</a:t>
+              <a:t>24/01/2022</a:t>
             </a:fld>
             <a:endParaRPr lang="en-DK"/>
           </a:p>
@@ -18999,7 +18999,7 @@
           <a:p>
             <a:fld id="{904D49A9-ADA7-4370-9052-09D7E5AC09B3}" type="datetimeFigureOut">
               <a:rPr lang="en-DK" smtClean="0"/>
-              <a:t>28/12/2021</a:t>
+              <a:t>24/01/2022</a:t>
             </a:fld>
             <a:endParaRPr lang="en-DK"/>
           </a:p>
@@ -19112,7 +19112,7 @@
           <a:p>
             <a:fld id="{938D4F65-00CB-47A6-A36C-DC88716242B1}" type="datetimeFigureOut">
               <a:rPr lang="en-DK" smtClean="0"/>
-              <a:t>28/12/2021</a:t>
+              <a:t>24/01/2022</a:t>
             </a:fld>
             <a:endParaRPr lang="en-DK"/>
           </a:p>
@@ -19312,7 +19312,7 @@
           <a:p>
             <a:fld id="{904D49A9-ADA7-4370-9052-09D7E5AC09B3}" type="datetimeFigureOut">
               <a:rPr lang="en-DK" smtClean="0"/>
-              <a:t>28/12/2021</a:t>
+              <a:t>24/01/2022</a:t>
             </a:fld>
             <a:endParaRPr lang="en-DK"/>
           </a:p>
@@ -19588,7 +19588,7 @@
           <a:p>
             <a:fld id="{904D49A9-ADA7-4370-9052-09D7E5AC09B3}" type="datetimeFigureOut">
               <a:rPr lang="en-DK" smtClean="0"/>
-              <a:t>28/12/2021</a:t>
+              <a:t>24/01/2022</a:t>
             </a:fld>
             <a:endParaRPr lang="en-DK"/>
           </a:p>
@@ -19856,7 +19856,7 @@
           <a:p>
             <a:fld id="{904D49A9-ADA7-4370-9052-09D7E5AC09B3}" type="datetimeFigureOut">
               <a:rPr lang="en-DK" smtClean="0"/>
-              <a:t>28/12/2021</a:t>
+              <a:t>24/01/2022</a:t>
             </a:fld>
             <a:endParaRPr lang="en-DK"/>
           </a:p>
@@ -20271,7 +20271,7 @@
           <a:p>
             <a:fld id="{904D49A9-ADA7-4370-9052-09D7E5AC09B3}" type="datetimeFigureOut">
               <a:rPr lang="en-DK" smtClean="0"/>
-              <a:t>28/12/2021</a:t>
+              <a:t>24/01/2022</a:t>
             </a:fld>
             <a:endParaRPr lang="en-DK"/>
           </a:p>
@@ -20413,7 +20413,7 @@
           <a:p>
             <a:fld id="{904D49A9-ADA7-4370-9052-09D7E5AC09B3}" type="datetimeFigureOut">
               <a:rPr lang="en-DK" smtClean="0"/>
-              <a:t>28/12/2021</a:t>
+              <a:t>24/01/2022</a:t>
             </a:fld>
             <a:endParaRPr lang="en-DK"/>
           </a:p>
@@ -20526,7 +20526,7 @@
           <a:p>
             <a:fld id="{904D49A9-ADA7-4370-9052-09D7E5AC09B3}" type="datetimeFigureOut">
               <a:rPr lang="en-DK" smtClean="0"/>
-              <a:t>28/12/2021</a:t>
+              <a:t>24/01/2022</a:t>
             </a:fld>
             <a:endParaRPr lang="en-DK"/>
           </a:p>
@@ -20839,7 +20839,7 @@
           <a:p>
             <a:fld id="{904D49A9-ADA7-4370-9052-09D7E5AC09B3}" type="datetimeFigureOut">
               <a:rPr lang="en-DK" smtClean="0"/>
-              <a:t>28/12/2021</a:t>
+              <a:t>24/01/2022</a:t>
             </a:fld>
             <a:endParaRPr lang="en-DK"/>
           </a:p>
@@ -21128,7 +21128,7 @@
           <a:p>
             <a:fld id="{904D49A9-ADA7-4370-9052-09D7E5AC09B3}" type="datetimeFigureOut">
               <a:rPr lang="en-DK" smtClean="0"/>
-              <a:t>28/12/2021</a:t>
+              <a:t>24/01/2022</a:t>
             </a:fld>
             <a:endParaRPr lang="en-DK"/>
           </a:p>
@@ -21371,7 +21371,7 @@
           <a:p>
             <a:fld id="{904D49A9-ADA7-4370-9052-09D7E5AC09B3}" type="datetimeFigureOut">
               <a:rPr lang="en-DK" smtClean="0"/>
-              <a:t>28/12/2021</a:t>
+              <a:t>24/01/2022</a:t>
             </a:fld>
             <a:endParaRPr lang="en-DK"/>
           </a:p>
@@ -21941,7 +21941,7 @@
           <a:p>
             <a:fld id="{938D4F65-00CB-47A6-A36C-DC88716242B1}" type="datetimeFigureOut">
               <a:rPr lang="en-DK" smtClean="0"/>
-              <a:t>28/12/2021</a:t>
+              <a:t>24/01/2022</a:t>
             </a:fld>
             <a:endParaRPr lang="en-DK"/>
           </a:p>
@@ -22749,7 +22749,7 @@
           <p:nvPr>
             <p:extLst>
               <p:ext uri="{D42A27DB-BD31-4B8C-83A1-F6EECF244321}">
-                <p14:modId xmlns:p14="http://schemas.microsoft.com/office/powerpoint/2010/main" val="62420765"/>
+                <p14:modId xmlns:p14="http://schemas.microsoft.com/office/powerpoint/2010/main" val="4056770166"/>
               </p:ext>
             </p:extLst>
           </p:nvPr>

</xml_diff>